<commit_message>
updated arithmetic and input
</commit_message>
<xml_diff>
--- a/Python Lesson 2 Arithmetic Operations.pptx
+++ b/Python Lesson 2 Arithmetic Operations.pptx
@@ -17720,7 +17720,7 @@
               <a:latin typeface="Microsoft YaHei UI" panose="020B0503020204020204" pitchFamily="34" charset="-122"/>
               <a:ea typeface="Microsoft YaHei UI" panose="020B0503020204020204" pitchFamily="34" charset="-122"/>
             </a:rPr>
-            <a:t>Python Day 2 Arithmetic Operations.pptx</a:t>
+            <a:t>Python Lesson 2 Arithmetic Operations.pptx</a:t>
           </a:r>
           <a:endParaRPr lang="en-US" dirty="0">
             <a:latin typeface="Microsoft YaHei UI" panose="020B0503020204020204" pitchFamily="34" charset="-122"/>
@@ -17751,49 +17751,6 @@
         </a:p>
       </dgm:t>
     </dgm:pt>
-    <dgm:pt modelId="{2C712156-D874-4A9D-81DB-6C2028DEEFAB}">
-      <dgm:prSet/>
-      <dgm:spPr/>
-      <dgm:t>
-        <a:bodyPr/>
-        <a:lstStyle/>
-        <a:p>
-          <a:r>
-            <a:rPr lang="en-US" i="1" dirty="0">
-              <a:latin typeface="Microsoft YaHei UI" panose="020B0503020204020204" pitchFamily="34" charset="-122"/>
-              <a:ea typeface="Microsoft YaHei UI" panose="020B0503020204020204" pitchFamily="34" charset="-122"/>
-            </a:rPr>
-            <a:t>1 Arithmetic Exercises.docx</a:t>
-          </a:r>
-          <a:endParaRPr lang="en-US" dirty="0">
-            <a:latin typeface="Microsoft YaHei UI" panose="020B0503020204020204" pitchFamily="34" charset="-122"/>
-            <a:ea typeface="Microsoft YaHei UI" panose="020B0503020204020204" pitchFamily="34" charset="-122"/>
-          </a:endParaRPr>
-        </a:p>
-      </dgm:t>
-    </dgm:pt>
-    <dgm:pt modelId="{9688DBAD-BC2C-436B-8F13-B8080D9DF2DE}" type="parTrans" cxnId="{F20D1B91-B338-48DC-991C-8F46A9E5D0DB}">
-      <dgm:prSet/>
-      <dgm:spPr/>
-      <dgm:t>
-        <a:bodyPr/>
-        <a:lstStyle/>
-        <a:p>
-          <a:endParaRPr lang="en-US"/>
-        </a:p>
-      </dgm:t>
-    </dgm:pt>
-    <dgm:pt modelId="{95619DED-8353-4565-836F-FD5015295B00}" type="sibTrans" cxnId="{F20D1B91-B338-48DC-991C-8F46A9E5D0DB}">
-      <dgm:prSet/>
-      <dgm:spPr/>
-      <dgm:t>
-        <a:bodyPr/>
-        <a:lstStyle/>
-        <a:p>
-          <a:endParaRPr lang="en-US"/>
-        </a:p>
-      </dgm:t>
-    </dgm:pt>
     <dgm:pt modelId="{AE49B9E4-1B63-4202-ACD8-2DCC062B8838}">
       <dgm:prSet/>
       <dgm:spPr/>
@@ -17814,10 +17771,24 @@
     <dgm:pt modelId="{D05D514A-A90E-48E6-A760-D267C74F4E96}" type="parTrans" cxnId="{97FF8912-F667-48C2-9D10-A98772C9824E}">
       <dgm:prSet/>
       <dgm:spPr/>
+      <dgm:t>
+        <a:bodyPr/>
+        <a:lstStyle/>
+        <a:p>
+          <a:endParaRPr lang="en-US"/>
+        </a:p>
+      </dgm:t>
     </dgm:pt>
     <dgm:pt modelId="{563DBEA3-7F5A-4273-B3EB-E9D26426FD89}" type="sibTrans" cxnId="{97FF8912-F667-48C2-9D10-A98772C9824E}">
       <dgm:prSet/>
       <dgm:spPr/>
+      <dgm:t>
+        <a:bodyPr/>
+        <a:lstStyle/>
+        <a:p>
+          <a:endParaRPr lang="en-US"/>
+        </a:p>
+      </dgm:t>
     </dgm:pt>
     <dgm:pt modelId="{C8E40DC9-A0B9-418C-A815-9CF2E6163A32}" type="pres">
       <dgm:prSet presAssocID="{C42EF8BB-B80A-4B3C-837B-8D9E7C3C95C5}" presName="linear" presStyleCnt="0">
@@ -17893,7 +17864,7 @@
     </dgm:pt>
   </dgm:ptLst>
   <dgm:cxnLst>
-    <dgm:cxn modelId="{97FF8912-F667-48C2-9D10-A98772C9824E}" srcId="{5F1B1324-F520-4701-BC9C-FF544C32A999}" destId="{AE49B9E4-1B63-4202-ACD8-2DCC062B8838}" srcOrd="1" destOrd="0" parTransId="{D05D514A-A90E-48E6-A760-D267C74F4E96}" sibTransId="{563DBEA3-7F5A-4273-B3EB-E9D26426FD89}"/>
+    <dgm:cxn modelId="{97FF8912-F667-48C2-9D10-A98772C9824E}" srcId="{5F1B1324-F520-4701-BC9C-FF544C32A999}" destId="{AE49B9E4-1B63-4202-ACD8-2DCC062B8838}" srcOrd="0" destOrd="0" parTransId="{D05D514A-A90E-48E6-A760-D267C74F4E96}" sibTransId="{563DBEA3-7F5A-4273-B3EB-E9D26426FD89}"/>
     <dgm:cxn modelId="{6F7A621D-B631-44CC-B36B-36BBA9242F7A}" srcId="{7900D2EE-49A3-4AB2-83D9-BA5FFA7CB94A}" destId="{15D444DE-B4A3-472D-B958-3C8786D2CF19}" srcOrd="1" destOrd="0" parTransId="{4364F49D-91B4-4DAB-89AC-5EBC17B339B8}" sibTransId="{09146FCF-45E1-410C-9138-E8727ED189BB}"/>
     <dgm:cxn modelId="{B0FFD620-629C-4540-BDAB-55BCB5470C56}" type="presOf" srcId="{7900D2EE-49A3-4AB2-83D9-BA5FFA7CB94A}" destId="{1E5CE579-12CC-4928-A5C7-93AFAA63C391}" srcOrd="1" destOrd="0" presId="urn:microsoft.com/office/officeart/2005/8/layout/list1"/>
     <dgm:cxn modelId="{4CDCC523-48E6-4479-844C-707217AD0C7D}" type="presOf" srcId="{06086957-048C-4C8D-9D32-1A5124E6B90B}" destId="{7BEFE999-F660-441C-89D6-D5BC0740A1B4}" srcOrd="0" destOrd="0" presId="urn:microsoft.com/office/officeart/2005/8/layout/list1"/>
@@ -17902,15 +17873,13 @@
     <dgm:cxn modelId="{3518B92C-270C-45C6-85FB-32349169458D}" srcId="{7900D2EE-49A3-4AB2-83D9-BA5FFA7CB94A}" destId="{6205AC9D-DFDA-4117-8F16-6C0E179681AE}" srcOrd="0" destOrd="0" parTransId="{B19C788D-B728-4880-88A8-EF3339CFB20C}" sibTransId="{2347B2E0-FEC5-4FD0-873C-E1D292B42DD3}"/>
     <dgm:cxn modelId="{7CE7732D-CB7D-4813-BC14-1359899A3029}" type="presOf" srcId="{0A95EFAF-3059-4023-BF9D-5D51F36F15B3}" destId="{8ABC40ED-68F1-4C04-A7EA-7EC4A5F9A566}" srcOrd="0" destOrd="0" presId="urn:microsoft.com/office/officeart/2005/8/layout/list1"/>
     <dgm:cxn modelId="{7D3B3237-9510-4158-8538-D5540EB4D55F}" type="presOf" srcId="{6205AC9D-DFDA-4117-8F16-6C0E179681AE}" destId="{C58F71FB-F3DE-492E-8C99-7B87F00ED921}" srcOrd="0" destOrd="0" presId="urn:microsoft.com/office/officeart/2005/8/layout/list1"/>
-    <dgm:cxn modelId="{2A22615E-CE79-41CE-B8D1-393F039E490C}" type="presOf" srcId="{AE49B9E4-1B63-4202-ACD8-2DCC062B8838}" destId="{7BEFE999-F660-441C-89D6-D5BC0740A1B4}" srcOrd="0" destOrd="4" presId="urn:microsoft.com/office/officeart/2005/8/layout/list1"/>
+    <dgm:cxn modelId="{2A22615E-CE79-41CE-B8D1-393F039E490C}" type="presOf" srcId="{AE49B9E4-1B63-4202-ACD8-2DCC062B8838}" destId="{7BEFE999-F660-441C-89D6-D5BC0740A1B4}" srcOrd="0" destOrd="3" presId="urn:microsoft.com/office/officeart/2005/8/layout/list1"/>
     <dgm:cxn modelId="{DC6A4B65-CB97-4611-94D3-4AFA3CBA54B2}" type="presOf" srcId="{05CD2E7C-39DC-4218-B58A-D6F110A02DAB}" destId="{7BEFE999-F660-441C-89D6-D5BC0740A1B4}" srcOrd="0" destOrd="1" presId="urn:microsoft.com/office/officeart/2005/8/layout/list1"/>
     <dgm:cxn modelId="{D9AE6F53-F23E-4D22-A2D2-978384D9EEC5}" type="presOf" srcId="{0A95EFAF-3059-4023-BF9D-5D51F36F15B3}" destId="{7D58E531-83F3-42B8-84F0-52F879CB8A3E}" srcOrd="1" destOrd="0" presId="urn:microsoft.com/office/officeart/2005/8/layout/list1"/>
     <dgm:cxn modelId="{D732BE86-334C-4616-883E-348C0DFCDA1E}" type="presOf" srcId="{C42EF8BB-B80A-4B3C-837B-8D9E7C3C95C5}" destId="{C8E40DC9-A0B9-418C-A815-9CF2E6163A32}" srcOrd="0" destOrd="0" presId="urn:microsoft.com/office/officeart/2005/8/layout/list1"/>
-    <dgm:cxn modelId="{F20D1B91-B338-48DC-991C-8F46A9E5D0DB}" srcId="{5F1B1324-F520-4701-BC9C-FF544C32A999}" destId="{2C712156-D874-4A9D-81DB-6C2028DEEFAB}" srcOrd="0" destOrd="0" parTransId="{9688DBAD-BC2C-436B-8F13-B8080D9DF2DE}" sibTransId="{95619DED-8353-4565-836F-FD5015295B00}"/>
     <dgm:cxn modelId="{98DB2FAA-3E77-4105-8F0B-26191AC638CA}" type="presOf" srcId="{5F1B1324-F520-4701-BC9C-FF544C32A999}" destId="{7BEFE999-F660-441C-89D6-D5BC0740A1B4}" srcOrd="0" destOrd="2" presId="urn:microsoft.com/office/officeart/2005/8/layout/list1"/>
     <dgm:cxn modelId="{E50563AB-7414-459C-BC30-845B80356864}" srcId="{C42EF8BB-B80A-4B3C-837B-8D9E7C3C95C5}" destId="{7900D2EE-49A3-4AB2-83D9-BA5FFA7CB94A}" srcOrd="0" destOrd="0" parTransId="{60A397A3-2B0B-41C5-90E0-032200B24A3B}" sibTransId="{85266887-FB94-4CBB-8F92-69EBD0228DBE}"/>
     <dgm:cxn modelId="{E422E2C3-E69D-40B0-B3CC-2DD2DA23B76A}" srcId="{C42EF8BB-B80A-4B3C-837B-8D9E7C3C95C5}" destId="{0A95EFAF-3059-4023-BF9D-5D51F36F15B3}" srcOrd="1" destOrd="0" parTransId="{6A1B2D26-D41C-4730-B2E6-36B23985CD7C}" sibTransId="{F03F4B71-A101-44A7-9631-851890FA27D7}"/>
-    <dgm:cxn modelId="{A9B9B5D4-319E-4E14-9CD2-ECCFC969B240}" type="presOf" srcId="{2C712156-D874-4A9D-81DB-6C2028DEEFAB}" destId="{7BEFE999-F660-441C-89D6-D5BC0740A1B4}" srcOrd="0" destOrd="3" presId="urn:microsoft.com/office/officeart/2005/8/layout/list1"/>
     <dgm:cxn modelId="{702CB1F0-9FB1-4A11-9FD7-2E438BFE5959}" type="presOf" srcId="{7900D2EE-49A3-4AB2-83D9-BA5FFA7CB94A}" destId="{5CB75AC6-B39B-4D7C-8BC1-0EDEF64972AE}" srcOrd="0" destOrd="0" presId="urn:microsoft.com/office/officeart/2005/8/layout/list1"/>
     <dgm:cxn modelId="{F761A0F1-2087-4BAB-9296-E40F188C2CE2}" srcId="{0A95EFAF-3059-4023-BF9D-5D51F36F15B3}" destId="{5F1B1324-F520-4701-BC9C-FF544C32A999}" srcOrd="1" destOrd="0" parTransId="{8D8D5922-7862-4740-BE07-80A28C62FA7A}" sibTransId="{8A00C108-EFB0-403F-BAB7-A0C4B0030339}"/>
     <dgm:cxn modelId="{74E138F2-267C-4453-8C1B-978B5EBE6A49}" type="presOf" srcId="{15D444DE-B4A3-472D-B958-3C8786D2CF19}" destId="{C58F71FB-F3DE-492E-8C99-7B87F00ED921}" srcOrd="0" destOrd="1" presId="urn:microsoft.com/office/officeart/2005/8/layout/list1"/>
@@ -18650,7 +18619,7 @@
             <a:rPr lang="en-US" dirty="0">
               <a:latin typeface="+mn-lt"/>
             </a:rPr>
-            <a:t>The name is the label where that value is stored</a:t>
+            <a:t>The name is the label for where that value is stored</a:t>
           </a:r>
         </a:p>
       </dgm:t>
@@ -22279,8 +22248,8 @@
       </dsp:nvSpPr>
       <dsp:spPr>
         <a:xfrm>
-          <a:off x="0" y="274894"/>
-          <a:ext cx="10177699" cy="793800"/>
+          <a:off x="0" y="266344"/>
+          <a:ext cx="10177699" cy="907200"/>
         </a:xfrm>
         <a:prstGeom prst="rect">
           <a:avLst/>
@@ -22320,12 +22289,12 @@
         <a:fontRef idx="minor"/>
       </dsp:style>
       <dsp:txBody>
-        <a:bodyPr spcFirstLastPara="0" vert="horz" wrap="square" lIns="789903" tIns="291592" rIns="789903" bIns="99568" numCol="1" spcCol="1270" anchor="t" anchorCtr="0">
+        <a:bodyPr spcFirstLastPara="0" vert="horz" wrap="square" lIns="789903" tIns="333248" rIns="789903" bIns="113792" numCol="1" spcCol="1270" anchor="t" anchorCtr="0">
           <a:noAutofit/>
         </a:bodyPr>
         <a:lstStyle/>
         <a:p>
-          <a:pPr marL="114300" lvl="1" indent="-114300" algn="l" defTabSz="622300">
+          <a:pPr marL="171450" lvl="1" indent="-171450" algn="l" defTabSz="711200">
             <a:lnSpc>
               <a:spcPct val="90000"/>
             </a:lnSpc>
@@ -22338,13 +22307,13 @@
             <a:buChar char="•"/>
           </a:pPr>
           <a:r>
-            <a:rPr lang="en-US" sz="1400" kern="1200" dirty="0"/>
+            <a:rPr lang="en-US" sz="1600" kern="1200" dirty="0"/>
             <a:t>Book for additional reading</a:t>
           </a:r>
-          <a:endParaRPr lang="en-US" sz="1400" b="1" i="1" kern="1200" dirty="0"/>
+          <a:endParaRPr lang="en-US" sz="1600" b="1" i="1" kern="1200" dirty="0"/>
         </a:p>
         <a:p>
-          <a:pPr marL="114300" lvl="1" indent="-114300" algn="l" defTabSz="622300">
+          <a:pPr marL="171450" lvl="1" indent="-171450" algn="l" defTabSz="711200">
             <a:lnSpc>
               <a:spcPct val="90000"/>
             </a:lnSpc>
@@ -22357,14 +22326,14 @@
             <a:buChar char="•"/>
           </a:pPr>
           <a:r>
-            <a:rPr lang="en-US" sz="1400" b="0" i="0" kern="1200" dirty="0"/>
+            <a:rPr lang="en-US" sz="1600" b="0" i="0" kern="1200" dirty="0"/>
             <a:t>Meeting dates</a:t>
           </a:r>
         </a:p>
       </dsp:txBody>
       <dsp:txXfrm>
-        <a:off x="0" y="274894"/>
-        <a:ext cx="10177699" cy="793800"/>
+        <a:off x="0" y="266344"/>
+        <a:ext cx="10177699" cy="907200"/>
       </dsp:txXfrm>
     </dsp:sp>
     <dsp:sp modelId="{1E5CE579-12CC-4928-A5C7-93AFAA63C391}">
@@ -22374,8 +22343,8 @@
       </dsp:nvSpPr>
       <dsp:spPr>
         <a:xfrm>
-          <a:off x="508884" y="68254"/>
-          <a:ext cx="7124389" cy="413280"/>
+          <a:off x="508884" y="30184"/>
+          <a:ext cx="7124389" cy="472320"/>
         </a:xfrm>
         <a:prstGeom prst="roundRect">
           <a:avLst/>
@@ -22443,7 +22412,7 @@
         </a:bodyPr>
         <a:lstStyle/>
         <a:p>
-          <a:pPr marL="0" lvl="0" indent="0" algn="l" defTabSz="622300">
+          <a:pPr marL="0" lvl="0" indent="0" algn="l" defTabSz="711200">
             <a:lnSpc>
               <a:spcPct val="90000"/>
             </a:lnSpc>
@@ -22456,14 +22425,14 @@
             <a:buNone/>
           </a:pPr>
           <a:r>
-            <a:rPr lang="en-US" sz="1400" kern="1200" dirty="0"/>
+            <a:rPr lang="en-US" sz="1600" kern="1200" dirty="0"/>
             <a:t>http://www.eecs.ucf.edu/JuniorKnights/material/</a:t>
           </a:r>
         </a:p>
       </dsp:txBody>
       <dsp:txXfrm>
-        <a:off x="529059" y="88429"/>
-        <a:ext cx="7084039" cy="372930"/>
+        <a:off x="531941" y="53241"/>
+        <a:ext cx="7078275" cy="426206"/>
       </dsp:txXfrm>
     </dsp:sp>
     <dsp:sp modelId="{7BEFE999-F660-441C-89D6-D5BC0740A1B4}">
@@ -22473,8 +22442,8 @@
       </dsp:nvSpPr>
       <dsp:spPr>
         <a:xfrm>
-          <a:off x="0" y="1350935"/>
-          <a:ext cx="10177699" cy="1719900"/>
+          <a:off x="0" y="1496104"/>
+          <a:ext cx="10177699" cy="1612800"/>
         </a:xfrm>
         <a:prstGeom prst="rect">
           <a:avLst/>
@@ -22514,12 +22483,12 @@
         <a:fontRef idx="minor"/>
       </dsp:style>
       <dsp:txBody>
-        <a:bodyPr spcFirstLastPara="0" vert="horz" wrap="square" lIns="789903" tIns="291592" rIns="789903" bIns="99568" numCol="1" spcCol="1270" anchor="t" anchorCtr="0">
+        <a:bodyPr spcFirstLastPara="0" vert="horz" wrap="square" lIns="789903" tIns="333248" rIns="789903" bIns="113792" numCol="1" spcCol="1270" anchor="t" anchorCtr="0">
           <a:noAutofit/>
         </a:bodyPr>
         <a:lstStyle/>
         <a:p>
-          <a:pPr marL="114300" lvl="1" indent="-114300" algn="l" defTabSz="622300">
+          <a:pPr marL="171450" lvl="1" indent="-171450" algn="l" defTabSz="711200">
             <a:lnSpc>
               <a:spcPct val="90000"/>
             </a:lnSpc>
@@ -22532,12 +22501,12 @@
             <a:buChar char="•"/>
           </a:pPr>
           <a:r>
-            <a:rPr lang="en-US" sz="1400" kern="1200" dirty="0"/>
+            <a:rPr lang="en-US" sz="1600" kern="1200" dirty="0"/>
             <a:t>These slides are</a:t>
           </a:r>
         </a:p>
         <a:p>
-          <a:pPr marL="228600" lvl="2" indent="-114300" algn="l" defTabSz="622300">
+          <a:pPr marL="342900" lvl="2" indent="-171450" algn="l" defTabSz="711200">
             <a:lnSpc>
               <a:spcPct val="90000"/>
             </a:lnSpc>
@@ -22550,19 +22519,19 @@
             <a:buChar char="•"/>
           </a:pPr>
           <a:r>
-            <a:rPr lang="en-US" sz="1400" i="1" kern="1200" dirty="0">
+            <a:rPr lang="en-US" sz="1600" i="1" kern="1200" dirty="0">
               <a:latin typeface="Microsoft YaHei UI" panose="020B0503020204020204" pitchFamily="34" charset="-122"/>
               <a:ea typeface="Microsoft YaHei UI" panose="020B0503020204020204" pitchFamily="34" charset="-122"/>
             </a:rPr>
-            <a:t>Python Day 2 Arithmetic Operations.pptx</a:t>
+            <a:t>Python Lesson 2 Arithmetic Operations.pptx</a:t>
           </a:r>
-          <a:endParaRPr lang="en-US" sz="1400" kern="1200" dirty="0">
+          <a:endParaRPr lang="en-US" sz="1600" kern="1200" dirty="0">
             <a:latin typeface="Microsoft YaHei UI" panose="020B0503020204020204" pitchFamily="34" charset="-122"/>
             <a:ea typeface="Microsoft YaHei UI" panose="020B0503020204020204" pitchFamily="34" charset="-122"/>
           </a:endParaRPr>
         </a:p>
         <a:p>
-          <a:pPr marL="114300" lvl="1" indent="-114300" algn="l" defTabSz="622300">
+          <a:pPr marL="171450" lvl="1" indent="-171450" algn="l" defTabSz="711200">
             <a:lnSpc>
               <a:spcPct val="90000"/>
             </a:lnSpc>
@@ -22575,12 +22544,12 @@
             <a:buChar char="•"/>
           </a:pPr>
           <a:r>
-            <a:rPr lang="en-US" sz="1400" kern="1200" dirty="0"/>
+            <a:rPr lang="en-US" sz="1600" kern="1200" dirty="0"/>
             <a:t>The problems for today are</a:t>
           </a:r>
         </a:p>
         <a:p>
-          <a:pPr marL="228600" lvl="2" indent="-114300" algn="l" defTabSz="622300">
+          <a:pPr marL="342900" lvl="2" indent="-171450" algn="l" defTabSz="711200">
             <a:lnSpc>
               <a:spcPct val="90000"/>
             </a:lnSpc>
@@ -22593,32 +22562,7 @@
             <a:buChar char="•"/>
           </a:pPr>
           <a:r>
-            <a:rPr lang="en-US" sz="1400" i="1" kern="1200" dirty="0">
-              <a:latin typeface="Microsoft YaHei UI" panose="020B0503020204020204" pitchFamily="34" charset="-122"/>
-              <a:ea typeface="Microsoft YaHei UI" panose="020B0503020204020204" pitchFamily="34" charset="-122"/>
-            </a:rPr>
-            <a:t>1 Arithmetic Exercises.docx</a:t>
-          </a:r>
-          <a:endParaRPr lang="en-US" sz="1400" kern="1200" dirty="0">
-            <a:latin typeface="Microsoft YaHei UI" panose="020B0503020204020204" pitchFamily="34" charset="-122"/>
-            <a:ea typeface="Microsoft YaHei UI" panose="020B0503020204020204" pitchFamily="34" charset="-122"/>
-          </a:endParaRPr>
-        </a:p>
-        <a:p>
-          <a:pPr marL="228600" lvl="2" indent="-114300" algn="l" defTabSz="622300">
-            <a:lnSpc>
-              <a:spcPct val="90000"/>
-            </a:lnSpc>
-            <a:spcBef>
-              <a:spcPct val="0"/>
-            </a:spcBef>
-            <a:spcAft>
-              <a:spcPct val="15000"/>
-            </a:spcAft>
-            <a:buChar char="•"/>
-          </a:pPr>
-          <a:r>
-            <a:rPr lang="en-US" sz="1400" kern="1200" dirty="0">
+            <a:rPr lang="en-US" sz="1600" kern="1200" dirty="0">
               <a:latin typeface="Microsoft YaHei UI" panose="020B0503020204020204" pitchFamily="34" charset="-122"/>
               <a:ea typeface="Microsoft YaHei UI" panose="020B0503020204020204" pitchFamily="34" charset="-122"/>
             </a:rPr>
@@ -22627,8 +22571,8 @@
         </a:p>
       </dsp:txBody>
       <dsp:txXfrm>
-        <a:off x="0" y="1350935"/>
-        <a:ext cx="10177699" cy="1719900"/>
+        <a:off x="0" y="1496104"/>
+        <a:ext cx="10177699" cy="1612800"/>
       </dsp:txXfrm>
     </dsp:sp>
     <dsp:sp modelId="{7D58E531-83F3-42B8-84F0-52F879CB8A3E}">
@@ -22638,8 +22582,8 @@
       </dsp:nvSpPr>
       <dsp:spPr>
         <a:xfrm>
-          <a:off x="508884" y="1144295"/>
-          <a:ext cx="7124389" cy="413280"/>
+          <a:off x="508884" y="1259944"/>
+          <a:ext cx="7124389" cy="472320"/>
         </a:xfrm>
         <a:prstGeom prst="roundRect">
           <a:avLst/>
@@ -22707,7 +22651,7 @@
         </a:bodyPr>
         <a:lstStyle/>
         <a:p>
-          <a:pPr marL="0" lvl="0" indent="0" algn="l" defTabSz="622300">
+          <a:pPr marL="0" lvl="0" indent="0" algn="l" defTabSz="711200">
             <a:lnSpc>
               <a:spcPct val="90000"/>
             </a:lnSpc>
@@ -22720,22 +22664,22 @@
             <a:buNone/>
           </a:pPr>
           <a:r>
-            <a:rPr lang="en-US" sz="1400" b="0" i="0" kern="1200" dirty="0"/>
+            <a:rPr lang="en-US" sz="1600" b="0" i="0" kern="1200" dirty="0"/>
             <a:t>github.com/</a:t>
           </a:r>
           <a:r>
-            <a:rPr lang="en-US" sz="1400" b="0" i="0" kern="1200" dirty="0" err="1"/>
+            <a:rPr lang="en-US" sz="1600" b="0" i="0" kern="1200" dirty="0" err="1"/>
             <a:t>rsera</a:t>
           </a:r>
           <a:r>
-            <a:rPr lang="en-US" sz="1400" b="0" i="0" kern="1200" dirty="0"/>
+            <a:rPr lang="en-US" sz="1600" b="0" i="0" kern="1200" dirty="0"/>
             <a:t>/junior-knights</a:t>
           </a:r>
         </a:p>
       </dsp:txBody>
       <dsp:txXfrm>
-        <a:off x="529059" y="1164470"/>
-        <a:ext cx="7084039" cy="372930"/>
+        <a:off x="531941" y="1283001"/>
+        <a:ext cx="7078275" cy="426206"/>
       </dsp:txXfrm>
     </dsp:sp>
   </dsp:spTree>
@@ -23505,7 +23449,7 @@
             <a:rPr lang="en-US" sz="3400" kern="1200" dirty="0">
               <a:latin typeface="+mn-lt"/>
             </a:rPr>
-            <a:t>The name is the label where that value is stored</a:t>
+            <a:t>The name is the label for where that value is stored</a:t>
           </a:r>
         </a:p>
       </dsp:txBody>
@@ -48603,7 +48547,7 @@
           <a:p>
             <a:fld id="{2632081B-9E57-490D-98F0-0935C15B415A}" type="datetimeFigureOut">
               <a:rPr lang="en-US" smtClean="0"/>
-              <a:t>10/19/2018</a:t>
+              <a:t>1/30/2019</a:t>
             </a:fld>
             <a:endParaRPr lang="en-US"/>
           </a:p>
@@ -49462,7 +49406,7 @@
           <a:p>
             <a:fld id="{1160EA64-D806-43AC-9DF2-F8C432F32B4C}" type="datetimeFigureOut">
               <a:rPr lang="en-US" smtClean="0"/>
-              <a:t>10/19/2018</a:t>
+              <a:t>1/30/2019</a:t>
             </a:fld>
             <a:endParaRPr lang="en-US" dirty="0"/>
           </a:p>
@@ -49633,7 +49577,7 @@
           <a:p>
             <a:fld id="{E9F9C37B-1D36-470B-8223-D6C91242EC14}" type="datetimeFigureOut">
               <a:rPr lang="en-US" smtClean="0"/>
-              <a:t>10/19/2018</a:t>
+              <a:t>1/30/2019</a:t>
             </a:fld>
             <a:endParaRPr lang="en-US" dirty="0"/>
           </a:p>
@@ -49813,7 +49757,7 @@
           <a:p>
             <a:fld id="{67C6F52A-A82B-47A2-A83A-8C4C91F2D59F}" type="datetimeFigureOut">
               <a:rPr lang="en-US" smtClean="0"/>
-              <a:t>10/19/2018</a:t>
+              <a:t>1/30/2019</a:t>
             </a:fld>
             <a:endParaRPr lang="en-US" dirty="0"/>
           </a:p>
@@ -50365,7 +50309,7 @@
           <a:p>
             <a:fld id="{F070A7B3-6521-4DCA-87E5-044747A908C1}" type="datetimeFigureOut">
               <a:rPr lang="en-US" smtClean="0"/>
-              <a:t>10/19/2018</a:t>
+              <a:t>1/30/2019</a:t>
             </a:fld>
             <a:endParaRPr lang="en-US" dirty="0"/>
           </a:p>
@@ -50634,7 +50578,7 @@
           <a:p>
             <a:fld id="{1160EA64-D806-43AC-9DF2-F8C432F32B4C}" type="datetimeFigureOut">
               <a:rPr lang="en-US" smtClean="0"/>
-              <a:t>10/19/2018</a:t>
+              <a:t>1/30/2019</a:t>
             </a:fld>
             <a:endParaRPr lang="en-US" dirty="0"/>
           </a:p>
@@ -50867,7 +50811,7 @@
           <a:p>
             <a:fld id="{AB134690-1557-4C89-A502-4959FE7FAD70}" type="datetimeFigureOut">
               <a:rPr lang="en-US" smtClean="0"/>
-              <a:t>10/19/2018</a:t>
+              <a:t>1/30/2019</a:t>
             </a:fld>
             <a:endParaRPr lang="en-US" dirty="0"/>
           </a:p>
@@ -51222,7 +51166,7 @@
           <a:p>
             <a:fld id="{4F7D4976-E339-4826-83B7-FBD03F55ECF8}" type="datetimeFigureOut">
               <a:rPr lang="en-US" smtClean="0"/>
-              <a:t>10/19/2018</a:t>
+              <a:t>1/30/2019</a:t>
             </a:fld>
             <a:endParaRPr lang="en-US" dirty="0"/>
           </a:p>
@@ -51363,7 +51307,7 @@
           <a:p>
             <a:fld id="{E1037C31-9E7A-4F99-8774-A0E530DE1A42}" type="datetimeFigureOut">
               <a:rPr lang="en-US" smtClean="0"/>
-              <a:t>10/19/2018</a:t>
+              <a:t>1/30/2019</a:t>
             </a:fld>
             <a:endParaRPr lang="en-US" dirty="0"/>
           </a:p>
@@ -51458,7 +51402,7 @@
           <a:p>
             <a:fld id="{C278504F-A551-4DE0-9316-4DCD1D8CC752}" type="datetimeFigureOut">
               <a:rPr lang="en-US" smtClean="0"/>
-              <a:t>10/19/2018</a:t>
+              <a:t>1/30/2019</a:t>
             </a:fld>
             <a:endParaRPr lang="en-US" dirty="0"/>
           </a:p>
@@ -51815,7 +51759,7 @@
           <a:p>
             <a:fld id="{D1BE4249-C0D0-4B06-8692-E8BB871AF643}" type="datetimeFigureOut">
               <a:rPr lang="en-US" smtClean="0"/>
-              <a:t>10/19/2018</a:t>
+              <a:t>1/30/2019</a:t>
             </a:fld>
             <a:endParaRPr lang="en-US" dirty="0"/>
           </a:p>
@@ -52171,7 +52115,7 @@
           <a:p>
             <a:fld id="{042B0DB6-F5C7-45FB-8CF3-31B45F9C2DAC}" type="datetimeFigureOut">
               <a:rPr lang="en-US" smtClean="0"/>
-              <a:t>10/19/2018</a:t>
+              <a:t>1/30/2019</a:t>
             </a:fld>
             <a:endParaRPr lang="en-US" dirty="0"/>
           </a:p>
@@ -52410,7 +52354,7 @@
           <a:p>
             <a:fld id="{1160EA64-D806-43AC-9DF2-F8C432F32B4C}" type="datetimeFigureOut">
               <a:rPr lang="en-US" smtClean="0"/>
-              <a:t>10/19/2018</a:t>
+              <a:t>1/30/2019</a:t>
             </a:fld>
             <a:endParaRPr lang="en-US" dirty="0"/>
           </a:p>
@@ -55521,7 +55465,7 @@
             <p:ph idx="1"/>
             <p:extLst>
               <p:ext uri="{D42A27DB-BD31-4B8C-83A1-F6EECF244321}">
-                <p14:modId xmlns:p14="http://schemas.microsoft.com/office/powerpoint/2010/main" val="1845345878"/>
+                <p14:modId xmlns:p14="http://schemas.microsoft.com/office/powerpoint/2010/main" val="3017632406"/>
               </p:ext>
             </p:extLst>
           </p:nvPr>
@@ -56138,7 +56082,7 @@
             <p:ph idx="1"/>
             <p:extLst>
               <p:ext uri="{D42A27DB-BD31-4B8C-83A1-F6EECF244321}">
-                <p14:modId xmlns:p14="http://schemas.microsoft.com/office/powerpoint/2010/main" val="1820471433"/>
+                <p14:modId xmlns:p14="http://schemas.microsoft.com/office/powerpoint/2010/main" val="2423052167"/>
               </p:ext>
             </p:extLst>
           </p:nvPr>

</xml_diff>